<commit_message>
added powerpoint, updated SAG
</commit_message>
<xml_diff>
--- a/cs534L-SAGmf.pptx
+++ b/cs534L-SAGmf.pptx
@@ -11423,6 +11423,10 @@
               <a:t>many </a:t>
             </a:r>
             <a:r>
+              <a:rPr lang="en-CA" dirty="0" smtClean="0"/>
+              <a:t>model-based </a:t>
+            </a:r>
+            <a:r>
               <a:rPr lang="en-CA" dirty="0" err="1" smtClean="0"/>
               <a:t>RecSys</a:t>
             </a:r>
@@ -11716,8 +11720,13 @@
             </a:pPr>
             <a:r>
               <a:rPr lang="en-US" dirty="0" smtClean="0"/>
-              <a:t>Binary Data</a:t>
-            </a:r>
+              <a:t>Binary </a:t>
+            </a:r>
+            <a:r>
+              <a:rPr lang="en-US" dirty="0" smtClean="0"/>
+              <a:t>Data</a:t>
+            </a:r>
+            <a:endParaRPr lang="en-US" dirty="0" smtClean="0"/>
           </a:p>
           <a:p>
             <a:r>
@@ -11752,23 +11761,6 @@
               <a:buNone/>
             </a:pPr>
             <a:endParaRPr lang="en-US" dirty="0" smtClean="0"/>
-          </a:p>
-          <a:p>
-            <a:pPr marL="0" indent="0" algn="ctr">
-              <a:buNone/>
-            </a:pPr>
-            <a:r>
-              <a:rPr lang="en-US" dirty="0" smtClean="0"/>
-              <a:t>Numerical Data</a:t>
-            </a:r>
-            <a:endParaRPr lang="en-US" dirty="0"/>
-          </a:p>
-          <a:p>
-            <a:r>
-              <a:rPr lang="en-US" dirty="0" smtClean="0"/>
-              <a:t>MNAR</a:t>
-            </a:r>
-            <a:endParaRPr lang="en-US" dirty="0"/>
           </a:p>
           <a:p>
             <a:endParaRPr lang="en-US" dirty="0"/>
@@ -11819,8 +11811,13 @@
             </a:pPr>
             <a:r>
               <a:rPr lang="en-US" dirty="0" smtClean="0"/>
-              <a:t>Binary Data</a:t>
-            </a:r>
+              <a:t>Binary </a:t>
+            </a:r>
+            <a:r>
+              <a:rPr lang="en-US" dirty="0"/>
+              <a:t>Data: Implicit feedback</a:t>
+            </a:r>
+            <a:endParaRPr lang="en-US" dirty="0" smtClean="0"/>
           </a:p>
           <a:p>
             <a:r>
@@ -13803,30 +13800,14 @@
             <a:pPr lvl="1"/>
             <a:r>
               <a:rPr lang="en-US" dirty="0" smtClean="0"/>
-              <a:t>Fast </a:t>
-            </a:r>
+              <a:t>Fast Convergence: similar to Full gradient</a:t>
+            </a:r>
+          </a:p>
+          <a:p>
+            <a:pPr lvl="1"/>
             <a:r>
               <a:rPr lang="en-US" dirty="0" smtClean="0"/>
-              <a:t>Convergence: </a:t>
-            </a:r>
-            <a:r>
-              <a:rPr lang="en-US" dirty="0" smtClean="0"/>
-              <a:t>similar to Full gradient</a:t>
-            </a:r>
-          </a:p>
-          <a:p>
-            <a:pPr lvl="1"/>
-            <a:r>
-              <a:rPr lang="en-US" dirty="0" smtClean="0"/>
-              <a:t>O(1) samples per </a:t>
-            </a:r>
-            <a:r>
-              <a:rPr lang="en-US" dirty="0" smtClean="0"/>
-              <a:t>iteration: </a:t>
-            </a:r>
-            <a:r>
-              <a:rPr lang="en-US" dirty="0" smtClean="0"/>
-              <a:t>similar to Stochastic</a:t>
+              <a:t>O(1) samples per iteration: similar to Stochastic</a:t>
             </a:r>
           </a:p>
           <a:p>
@@ -13900,11 +13881,7 @@
           <a:p>
             <a:r>
               <a:rPr lang="en-US" dirty="0" smtClean="0"/>
-              <a:t>Space </a:t>
-            </a:r>
-            <a:r>
-              <a:rPr lang="en-US" dirty="0" smtClean="0"/>
-              <a:t>Complexity</a:t>
+              <a:t>Space Complexity</a:t>
             </a:r>
             <a:r>
               <a:rPr lang="en-US" smtClean="0"/>
@@ -13937,8 +13914,8 @@
           </a:p>
         </p:txBody>
       </p:sp>
-      <mc:AlternateContent xmlns:mc="http://schemas.openxmlformats.org/markup-compatibility/2006">
-        <mc:Choice xmlns:a14="http://schemas.microsoft.com/office/drawing/2010/main" Requires="a14">
+      <mc:AlternateContent xmlns:mc="http://schemas.openxmlformats.org/markup-compatibility/2006" xmlns:a14="http://schemas.microsoft.com/office/drawing/2010/main">
+        <mc:Choice Requires="a14">
           <p:sp>
             <p:nvSpPr>
               <p:cNvPr id="3" name="Content Placeholder 2"/>
@@ -14797,7 +14774,7 @@
             </p:txBody>
           </p:sp>
         </mc:Choice>
-        <mc:Fallback>
+        <mc:Fallback xmlns="">
           <p:sp>
             <p:nvSpPr>
               <p:cNvPr id="3" name="Content Placeholder 2"/>
@@ -15051,11 +15028,7 @@
             </a:r>
             <a:r>
               <a:rPr lang="en-CA" dirty="0" smtClean="0"/>
-              <a:t>limited, </a:t>
-            </a:r>
-            <a:r>
-              <a:rPr lang="en-CA" dirty="0" smtClean="0"/>
-              <a:t>page faults</a:t>
+              <a:t>limited, page faults</a:t>
             </a:r>
             <a:endParaRPr lang="en-CA" dirty="0"/>
           </a:p>

</xml_diff>

<commit_message>
Updated intro and refs of paper
introduction.tex
refs.bib
</commit_message>
<xml_diff>
--- a/cs534L-SAGmf.pptx
+++ b/cs534L-SAGmf.pptx
@@ -1363,6 +1363,10 @@
           <a:bodyPr/>
           <a:lstStyle/>
           <a:p>
+            <a:r>
+              <a:rPr lang="en-CA" dirty="0" smtClean="0"/>
+              <a:t>Justify why these objective functions are chosen.</a:t>
+            </a:r>
             <a:endParaRPr lang="en-CA" dirty="0"/>
           </a:p>
         </p:txBody>
@@ -2532,6 +2536,174 @@
 </p:notes>
 </file>
 
+<file path=ppt/notesSlides/notesSlide28.xml><?xml version="1.0" encoding="utf-8"?>
+<p:notes xmlns:a="http://schemas.openxmlformats.org/drawingml/2006/main" xmlns:r="http://schemas.openxmlformats.org/officeDocument/2006/relationships" xmlns:p="http://schemas.openxmlformats.org/presentationml/2006/main">
+  <p:cSld>
+    <p:spTree>
+      <p:nvGrpSpPr>
+        <p:cNvPr id="1" name=""/>
+        <p:cNvGrpSpPr/>
+        <p:nvPr/>
+      </p:nvGrpSpPr>
+      <p:grpSpPr>
+        <a:xfrm>
+          <a:off x="0" y="0"/>
+          <a:ext cx="0" cy="0"/>
+          <a:chOff x="0" y="0"/>
+          <a:chExt cx="0" cy="0"/>
+        </a:xfrm>
+      </p:grpSpPr>
+      <p:sp>
+        <p:nvSpPr>
+          <p:cNvPr id="2" name="Slide Image Placeholder 1"/>
+          <p:cNvSpPr>
+            <a:spLocks noGrp="1" noRot="1" noChangeAspect="1"/>
+          </p:cNvSpPr>
+          <p:nvPr>
+            <p:ph type="sldImg"/>
+          </p:nvPr>
+        </p:nvSpPr>
+        <p:spPr/>
+      </p:sp>
+      <p:sp>
+        <p:nvSpPr>
+          <p:cNvPr id="3" name="Notes Placeholder 2"/>
+          <p:cNvSpPr>
+            <a:spLocks noGrp="1"/>
+          </p:cNvSpPr>
+          <p:nvPr>
+            <p:ph type="body" idx="1"/>
+          </p:nvPr>
+        </p:nvSpPr>
+        <p:spPr/>
+        <p:txBody>
+          <a:bodyPr/>
+          <a:lstStyle/>
+          <a:p>
+            <a:endParaRPr lang="en-CA" dirty="0"/>
+          </a:p>
+        </p:txBody>
+      </p:sp>
+      <p:sp>
+        <p:nvSpPr>
+          <p:cNvPr id="4" name="Slide Number Placeholder 3"/>
+          <p:cNvSpPr>
+            <a:spLocks noGrp="1"/>
+          </p:cNvSpPr>
+          <p:nvPr>
+            <p:ph type="sldNum" sz="quarter" idx="10"/>
+          </p:nvPr>
+        </p:nvSpPr>
+        <p:spPr/>
+        <p:txBody>
+          <a:bodyPr/>
+          <a:lstStyle/>
+          <a:p>
+            <a:fld id="{EA5C61F1-C4D7-4183-9419-26D6C7EA246C}" type="slidenum">
+              <a:rPr lang="en-US" smtClean="0"/>
+              <a:t>56</a:t>
+            </a:fld>
+            <a:endParaRPr lang="en-US"/>
+          </a:p>
+        </p:txBody>
+      </p:sp>
+    </p:spTree>
+    <p:extLst>
+      <p:ext uri="{BB962C8B-B14F-4D97-AF65-F5344CB8AC3E}">
+        <p14:creationId xmlns:p14="http://schemas.microsoft.com/office/powerpoint/2010/main" val="3466805603"/>
+      </p:ext>
+    </p:extLst>
+  </p:cSld>
+  <p:clrMapOvr>
+    <a:masterClrMapping/>
+  </p:clrMapOvr>
+</p:notes>
+</file>
+
+<file path=ppt/notesSlides/notesSlide29.xml><?xml version="1.0" encoding="utf-8"?>
+<p:notes xmlns:a="http://schemas.openxmlformats.org/drawingml/2006/main" xmlns:r="http://schemas.openxmlformats.org/officeDocument/2006/relationships" xmlns:p="http://schemas.openxmlformats.org/presentationml/2006/main">
+  <p:cSld>
+    <p:spTree>
+      <p:nvGrpSpPr>
+        <p:cNvPr id="1" name=""/>
+        <p:cNvGrpSpPr/>
+        <p:nvPr/>
+      </p:nvGrpSpPr>
+      <p:grpSpPr>
+        <a:xfrm>
+          <a:off x="0" y="0"/>
+          <a:ext cx="0" cy="0"/>
+          <a:chOff x="0" y="0"/>
+          <a:chExt cx="0" cy="0"/>
+        </a:xfrm>
+      </p:grpSpPr>
+      <p:sp>
+        <p:nvSpPr>
+          <p:cNvPr id="2" name="Slide Image Placeholder 1"/>
+          <p:cNvSpPr>
+            <a:spLocks noGrp="1" noRot="1" noChangeAspect="1"/>
+          </p:cNvSpPr>
+          <p:nvPr>
+            <p:ph type="sldImg"/>
+          </p:nvPr>
+        </p:nvSpPr>
+        <p:spPr/>
+      </p:sp>
+      <p:sp>
+        <p:nvSpPr>
+          <p:cNvPr id="3" name="Notes Placeholder 2"/>
+          <p:cNvSpPr>
+            <a:spLocks noGrp="1"/>
+          </p:cNvSpPr>
+          <p:nvPr>
+            <p:ph type="body" idx="1"/>
+          </p:nvPr>
+        </p:nvSpPr>
+        <p:spPr/>
+        <p:txBody>
+          <a:bodyPr/>
+          <a:lstStyle/>
+          <a:p>
+            <a:endParaRPr lang="en-CA" dirty="0"/>
+          </a:p>
+        </p:txBody>
+      </p:sp>
+      <p:sp>
+        <p:nvSpPr>
+          <p:cNvPr id="4" name="Slide Number Placeholder 3"/>
+          <p:cNvSpPr>
+            <a:spLocks noGrp="1"/>
+          </p:cNvSpPr>
+          <p:nvPr>
+            <p:ph type="sldNum" sz="quarter" idx="10"/>
+          </p:nvPr>
+        </p:nvSpPr>
+        <p:spPr/>
+        <p:txBody>
+          <a:bodyPr/>
+          <a:lstStyle/>
+          <a:p>
+            <a:fld id="{EA5C61F1-C4D7-4183-9419-26D6C7EA246C}" type="slidenum">
+              <a:rPr lang="en-US" smtClean="0"/>
+              <a:t>59</a:t>
+            </a:fld>
+            <a:endParaRPr lang="en-US"/>
+          </a:p>
+        </p:txBody>
+      </p:sp>
+    </p:spTree>
+    <p:extLst>
+      <p:ext uri="{BB962C8B-B14F-4D97-AF65-F5344CB8AC3E}">
+        <p14:creationId xmlns:p14="http://schemas.microsoft.com/office/powerpoint/2010/main" val="1441265553"/>
+      </p:ext>
+    </p:extLst>
+  </p:cSld>
+  <p:clrMapOvr>
+    <a:masterClrMapping/>
+  </p:clrMapOvr>
+</p:notes>
+</file>
+
 <file path=ppt/notesSlides/notesSlide3.xml><?xml version="1.0" encoding="utf-8"?>
 <p:notes xmlns:a="http://schemas.openxmlformats.org/drawingml/2006/main" xmlns:r="http://schemas.openxmlformats.org/officeDocument/2006/relationships" xmlns:p="http://schemas.openxmlformats.org/presentationml/2006/main">
   <p:cSld>
@@ -2758,6 +2930,14 @@
           <a:bodyPr/>
           <a:lstStyle/>
           <a:p>
+            <a:r>
+              <a:rPr lang="en-CA" dirty="0" smtClean="0"/>
+              <a:t>Datasets</a:t>
+            </a:r>
+            <a:r>
+              <a:rPr lang="en-CA" baseline="0" dirty="0" smtClean="0"/>
+              <a:t> are updating</a:t>
+            </a:r>
             <a:endParaRPr lang="en-CA" dirty="0"/>
           </a:p>
         </p:txBody>
@@ -30741,6 +30921,13 @@
       <p:transition spd="slow"/>
     </mc:Fallback>
   </mc:AlternateContent>
+  <p:timing>
+    <p:tnLst>
+      <p:par>
+        <p:cTn id="1" dur="indefinite" restart="never" nodeType="tmRoot"/>
+      </p:par>
+    </p:tnLst>
+  </p:timing>
 </p:sld>
 </file>
 
@@ -34016,7 +34203,7 @@
 </file>
 
 <file path=ppt/slides/slide35.xml><?xml version="1.0" encoding="utf-8"?>
-<p:sld xmlns:a="http://schemas.openxmlformats.org/drawingml/2006/main" xmlns:r="http://schemas.openxmlformats.org/officeDocument/2006/relationships" xmlns:p="http://schemas.openxmlformats.org/presentationml/2006/main">
+<p:sld xmlns:a="http://schemas.openxmlformats.org/drawingml/2006/main" xmlns:r="http://schemas.openxmlformats.org/officeDocument/2006/relationships" xmlns:p="http://schemas.openxmlformats.org/presentationml/2006/main" show="0">
   <p:cSld>
     <p:spTree>
       <p:nvGrpSpPr>
@@ -35393,7 +35580,7 @@
 </file>
 
 <file path=ppt/slides/slide37.xml><?xml version="1.0" encoding="utf-8"?>
-<p:sld xmlns:a="http://schemas.openxmlformats.org/drawingml/2006/main" xmlns:r="http://schemas.openxmlformats.org/officeDocument/2006/relationships" xmlns:p="http://schemas.openxmlformats.org/presentationml/2006/main">
+<p:sld xmlns:a="http://schemas.openxmlformats.org/drawingml/2006/main" xmlns:r="http://schemas.openxmlformats.org/officeDocument/2006/relationships" xmlns:p="http://schemas.openxmlformats.org/presentationml/2006/main" show="0">
   <p:cSld>
     <p:spTree>
       <p:nvGrpSpPr>
@@ -36460,12 +36647,22 @@
         </p:nvSpPr>
         <p:spPr/>
         <p:txBody>
-          <a:bodyPr/>
+          <a:bodyPr>
+            <a:normAutofit fontScale="90000"/>
+          </a:bodyPr>
           <a:lstStyle/>
           <a:p>
             <a:r>
               <a:rPr lang="en-CA" dirty="0" smtClean="0"/>
-              <a:t>Summary: Total Space Complexity</a:t>
+              <a:t>Summary: </a:t>
+            </a:r>
+            <a:r>
+              <a:rPr lang="en-CA" dirty="0" smtClean="0"/>
+              <a:t>Time &amp; </a:t>
+            </a:r>
+            <a:r>
+              <a:rPr lang="en-CA" dirty="0" smtClean="0"/>
+              <a:t>Space Complexity</a:t>
             </a:r>
             <a:endParaRPr lang="en-CA" dirty="0"/>
           </a:p>
@@ -37447,12 +37644,22 @@
         </p:nvSpPr>
         <p:spPr/>
         <p:txBody>
-          <a:bodyPr/>
+          <a:bodyPr>
+            <a:normAutofit fontScale="90000"/>
+          </a:bodyPr>
           <a:lstStyle/>
           <a:p>
             <a:r>
               <a:rPr lang="en-CA" dirty="0" smtClean="0"/>
-              <a:t>Summary: Total Space Complexity</a:t>
+              <a:t>Summary: </a:t>
+            </a:r>
+            <a:r>
+              <a:rPr lang="en-CA" dirty="0" smtClean="0"/>
+              <a:t>Time &amp; Space </a:t>
+            </a:r>
+            <a:r>
+              <a:rPr lang="en-CA" dirty="0" smtClean="0"/>
+              <a:t>Complexity</a:t>
             </a:r>
             <a:endParaRPr lang="en-CA" dirty="0"/>
           </a:p>
@@ -38965,7 +39172,7 @@
         </p:blipFill>
         <p:spPr>
           <a:xfrm>
-            <a:off x="-36512" y="-27384"/>
+            <a:off x="-36512" y="-747464"/>
             <a:ext cx="9180512" cy="6916824"/>
           </a:xfrm>
           <a:prstGeom prst="rect">
@@ -41674,6 +41881,13 @@
   <p:clrMapOvr>
     <a:masterClrMapping/>
   </p:clrMapOvr>
+  <p:timing>
+    <p:tnLst>
+      <p:par>
+        <p:cTn id="1" dur="indefinite" restart="never" nodeType="tmRoot"/>
+      </p:par>
+    </p:tnLst>
+  </p:timing>
 </p:sld>
 </file>
 
@@ -42588,6 +42802,14 @@
   <p:clrMapOvr>
     <a:masterClrMapping/>
   </p:clrMapOvr>
+  <mc:AlternateContent xmlns:mc="http://schemas.openxmlformats.org/markup-compatibility/2006">
+    <mc:Choice xmlns:p14="http://schemas.microsoft.com/office/powerpoint/2010/main" Requires="p14">
+      <p:transition spd="slow" p14:dur="2000"/>
+    </mc:Choice>
+    <mc:Fallback>
+      <p:transition spd="slow"/>
+    </mc:Fallback>
+  </mc:AlternateContent>
   <p:timing>
     <p:tnLst>
       <p:par>
@@ -42650,7 +42872,9 @@
                 <p:ph idx="1"/>
               </p:nvPr>
             </p:nvSpPr>
-            <p:spPr/>
+            <p:spPr>
+              <a:noFill/>
+            </p:spPr>
             <p:txBody>
               <a:bodyPr>
                 <a:normAutofit fontScale="92500" lnSpcReduction="20000"/>
@@ -42694,15 +42918,15 @@
                   <a:buAutoNum type="arabicPeriod"/>
                 </a:pPr>
                 <a:r>
-                  <a:rPr lang="en-CA" sz="2800" dirty="0" smtClean="0"/>
+                  <a:rPr lang="en-CA" sz="2800" u="sng" dirty="0" smtClean="0"/>
                   <a:t>Which </a:t>
                 </a:r>
                 <a:r>
-                  <a:rPr lang="en-CA" sz="2800" dirty="0"/>
+                  <a:rPr lang="en-CA" sz="2800" u="sng" dirty="0"/>
                   <a:t>yields higher quality </a:t>
                 </a:r>
                 <a:r>
-                  <a:rPr lang="en-CA" sz="2800" dirty="0" smtClean="0"/>
+                  <a:rPr lang="en-CA" sz="2800" u="sng" dirty="0" smtClean="0"/>
                   <a:t>recommendations: Better objective function vs. better convergence vs. better hyper-parameter selection?</a:t>
                 </a:r>
               </a:p>
@@ -42733,7 +42957,15 @@
                 </a:pPr>
                 <a:r>
                   <a:rPr lang="en-CA" sz="2800" dirty="0" smtClean="0"/>
-                  <a:t>SAG-MF knows the indices ahead, can we store </a:t>
+                  <a:t>SAG-MF knows the indices </a:t>
+                </a:r>
+                <a:r>
+                  <a:rPr lang="en-CA" sz="2800" dirty="0"/>
+                  <a:t>ahead</a:t>
+                </a:r>
+                <a:r>
+                  <a:rPr lang="en-CA" sz="2800" dirty="0" smtClean="0"/>
+                  <a:t>, can we store </a:t>
                 </a:r>
                 <a14:m>
                   <m:oMath xmlns:m="http://schemas.openxmlformats.org/officeDocument/2006/math">
@@ -43411,6 +43643,14 @@
   <p:clrMapOvr>
     <a:masterClrMapping/>
   </p:clrMapOvr>
+  <mc:AlternateContent xmlns:mc="http://schemas.openxmlformats.org/markup-compatibility/2006">
+    <mc:Choice xmlns:p14="http://schemas.microsoft.com/office/powerpoint/2010/main" Requires="p14">
+      <p:transition spd="slow" p14:dur="2000"/>
+    </mc:Choice>
+    <mc:Fallback>
+      <p:transition spd="slow"/>
+    </mc:Fallback>
+  </mc:AlternateContent>
   <p:timing>
     <p:tnLst>
       <p:par>
@@ -43618,7 +43858,7 @@
 </file>
 
 <file path=ppt/slides/slide54.xml><?xml version="1.0" encoding="utf-8"?>
-<p:sld xmlns:a="http://schemas.openxmlformats.org/drawingml/2006/main" xmlns:r="http://schemas.openxmlformats.org/officeDocument/2006/relationships" xmlns:p="http://schemas.openxmlformats.org/presentationml/2006/main" show="0">
+<p:sld xmlns:a="http://schemas.openxmlformats.org/drawingml/2006/main" xmlns:r="http://schemas.openxmlformats.org/officeDocument/2006/relationships" xmlns:p="http://schemas.openxmlformats.org/presentationml/2006/main">
   <p:cSld>
     <p:spTree>
       <p:nvGrpSpPr>
@@ -45180,7 +45420,7 @@
             </a:pPr>
             <a:r>
               <a:rPr lang="en-CA" dirty="0" smtClean="0"/>
-              <a:t>Even with re-computing, SAG-MF is still faster/better than both Full Deterministic (FG) and Stochastic Gradient (SG).</a:t>
+              <a:t>Even with re-computing, SAG-MF is still faster, better than both Full Deterministic (FG) and Stochastic Gradient (SG).</a:t>
             </a:r>
             <a:endParaRPr lang="en-CA" dirty="0"/>
           </a:p>
@@ -45266,6 +45506,13 @@
   <p:clrMapOvr>
     <a:masterClrMapping/>
   </p:clrMapOvr>
+  <p:timing>
+    <p:tnLst>
+      <p:par>
+        <p:cTn id="1" dur="indefinite" restart="never" nodeType="tmRoot"/>
+      </p:par>
+    </p:tnLst>
+  </p:timing>
 </p:sld>
 </file>
 
@@ -45591,6 +45838,13 @@
   <p:clrMapOvr>
     <a:masterClrMapping/>
   </p:clrMapOvr>
+  <p:timing>
+    <p:tnLst>
+      <p:par>
+        <p:cTn id="1" dur="indefinite" restart="never" nodeType="tmRoot"/>
+      </p:par>
+    </p:tnLst>
+  </p:timing>
 </p:sld>
 </file>
 

</xml_diff>